<commit_message>
update image with legend
</commit_message>
<xml_diff>
--- a/static/attachments/refguide/version-control/Collaboration Flow.pptx
+++ b/static/attachments/refguide/version-control/Collaboration Flow.pptx
@@ -4849,7 +4849,7 @@
           <a:p>
             <a:fld id="{88067BBD-0E9F-45A8-A3F0-0E6F9916CA42}" type="datetimeFigureOut">
               <a:rPr lang="en-US" smtClean="0"/>
-              <a:t>11/17/21</a:t>
+              <a:t>3/10/23</a:t>
             </a:fld>
             <a:endParaRPr lang="en-US"/>
           </a:p>
@@ -11758,7 +11758,7 @@
         </p:nvSpPr>
         <p:spPr>
           <a:xfrm>
-            <a:off x="1043769" y="3856125"/>
+            <a:off x="1080152" y="5030066"/>
             <a:ext cx="5541117" cy="745380"/>
           </a:xfrm>
           <a:prstGeom prst="rect">
@@ -11814,7 +11814,7 @@
         </p:nvCxnSpPr>
         <p:spPr>
           <a:xfrm flipH="1">
-            <a:off x="3775925" y="648037"/>
+            <a:off x="3812308" y="1821978"/>
             <a:ext cx="15474" cy="6916422"/>
           </a:xfrm>
           <a:prstGeom prst="line">
@@ -11852,7 +11852,7 @@
         </p:nvCxnSpPr>
         <p:spPr>
           <a:xfrm flipH="1">
-            <a:off x="2345103" y="648037"/>
+            <a:off x="2381486" y="1821978"/>
             <a:ext cx="66666" cy="6916422"/>
           </a:xfrm>
           <a:prstGeom prst="line">
@@ -11890,7 +11890,7 @@
         </p:nvCxnSpPr>
         <p:spPr>
           <a:xfrm flipH="1">
-            <a:off x="5223614" y="648037"/>
+            <a:off x="5259997" y="1821978"/>
             <a:ext cx="7944" cy="6916422"/>
           </a:xfrm>
           <a:prstGeom prst="line">
@@ -11926,7 +11926,7 @@
         </p:nvSpPr>
         <p:spPr>
           <a:xfrm>
-            <a:off x="904940" y="653120"/>
+            <a:off x="941323" y="1827061"/>
             <a:ext cx="1440160" cy="646331"/>
           </a:xfrm>
           <a:prstGeom prst="rect">
@@ -11969,7 +11969,7 @@
         </p:nvSpPr>
         <p:spPr>
           <a:xfrm>
-            <a:off x="5223614" y="648037"/>
+            <a:off x="5259997" y="1821978"/>
             <a:ext cx="1440160" cy="646331"/>
           </a:xfrm>
           <a:prstGeom prst="rect">
@@ -12012,7 +12012,7 @@
         </p:nvSpPr>
         <p:spPr>
           <a:xfrm>
-            <a:off x="3791398" y="648037"/>
+            <a:off x="3827781" y="1821978"/>
             <a:ext cx="1440160" cy="646331"/>
           </a:xfrm>
           <a:prstGeom prst="rect">
@@ -12055,7 +12055,7 @@
         </p:nvSpPr>
         <p:spPr>
           <a:xfrm>
-            <a:off x="2341820" y="652996"/>
+            <a:off x="2378203" y="1826937"/>
             <a:ext cx="1440160" cy="646331"/>
           </a:xfrm>
           <a:prstGeom prst="rect">
@@ -12098,7 +12098,7 @@
         </p:nvSpPr>
         <p:spPr>
           <a:xfrm>
-            <a:off x="2697913" y="4051928"/>
+            <a:off x="2734296" y="5225869"/>
             <a:ext cx="720076" cy="360040"/>
           </a:xfrm>
           <a:prstGeom prst="rect">
@@ -12152,7 +12152,7 @@
         </p:nvSpPr>
         <p:spPr>
           <a:xfrm>
-            <a:off x="1271124" y="2969187"/>
+            <a:off x="1307507" y="4143128"/>
             <a:ext cx="727806" cy="716033"/>
           </a:xfrm>
           <a:prstGeom prst="rect">
@@ -12209,7 +12209,7 @@
         </p:nvSpPr>
         <p:spPr>
           <a:xfrm>
-            <a:off x="2699616" y="2973798"/>
+            <a:off x="2735999" y="4147739"/>
             <a:ext cx="720076" cy="717440"/>
           </a:xfrm>
           <a:prstGeom prst="rect">
@@ -12268,7 +12268,7 @@
         </p:nvSpPr>
         <p:spPr>
           <a:xfrm>
-            <a:off x="4150382" y="4047696"/>
+            <a:off x="4186765" y="5221637"/>
             <a:ext cx="720076" cy="360040"/>
           </a:xfrm>
           <a:prstGeom prst="rect">
@@ -12325,7 +12325,7 @@
         </p:nvCxnSpPr>
         <p:spPr>
           <a:xfrm>
-            <a:off x="3059654" y="2610190"/>
+            <a:off x="3096037" y="3784131"/>
             <a:ext cx="0" cy="363608"/>
           </a:xfrm>
           <a:prstGeom prst="straightConnector1">
@@ -12366,7 +12366,7 @@
         </p:nvCxnSpPr>
         <p:spPr>
           <a:xfrm>
-            <a:off x="3057951" y="3692456"/>
+            <a:off x="3094334" y="4866397"/>
             <a:ext cx="0" cy="360036"/>
           </a:xfrm>
           <a:prstGeom prst="straightConnector1">
@@ -12405,7 +12405,7 @@
         </p:nvSpPr>
         <p:spPr>
           <a:xfrm>
-            <a:off x="1286434" y="3999034"/>
+            <a:off x="1322817" y="5172975"/>
             <a:ext cx="720066" cy="461665"/>
           </a:xfrm>
           <a:prstGeom prst="rect">
@@ -12445,7 +12445,7 @@
         </p:nvSpPr>
         <p:spPr>
           <a:xfrm>
-            <a:off x="1271124" y="2068976"/>
+            <a:off x="1307507" y="3242917"/>
             <a:ext cx="727806" cy="716033"/>
           </a:xfrm>
           <a:prstGeom prst="rect">
@@ -12509,7 +12509,7 @@
         </p:nvSpPr>
         <p:spPr>
           <a:xfrm>
-            <a:off x="2708431" y="2242330"/>
+            <a:off x="2744814" y="3416271"/>
             <a:ext cx="720076" cy="360040"/>
           </a:xfrm>
           <a:prstGeom prst="rect">
@@ -12563,7 +12563,7 @@
         </p:nvSpPr>
         <p:spPr>
           <a:xfrm>
-            <a:off x="4147473" y="2239512"/>
+            <a:off x="4183856" y="3413453"/>
             <a:ext cx="720076" cy="360040"/>
           </a:xfrm>
           <a:prstGeom prst="rect">
@@ -12617,7 +12617,7 @@
         </p:nvSpPr>
         <p:spPr>
           <a:xfrm>
-            <a:off x="5579689" y="2242541"/>
+            <a:off x="5616072" y="3416482"/>
             <a:ext cx="720076" cy="360040"/>
           </a:xfrm>
           <a:prstGeom prst="rect">
@@ -12671,7 +12671,7 @@
         </p:nvCxnSpPr>
         <p:spPr>
           <a:xfrm>
-            <a:off x="1998001" y="2425393"/>
+            <a:off x="2034384" y="3599334"/>
             <a:ext cx="716191" cy="703"/>
           </a:xfrm>
           <a:prstGeom prst="straightConnector1">
@@ -12713,7 +12713,7 @@
         </p:nvCxnSpPr>
         <p:spPr>
           <a:xfrm>
-            <a:off x="3427366" y="2426096"/>
+            <a:off x="3463749" y="3600037"/>
             <a:ext cx="717103" cy="0"/>
           </a:xfrm>
           <a:prstGeom prst="straightConnector1">
@@ -12754,7 +12754,7 @@
         </p:nvCxnSpPr>
         <p:spPr>
           <a:xfrm>
-            <a:off x="4868062" y="2426096"/>
+            <a:off x="4904445" y="3600037"/>
             <a:ext cx="717103" cy="0"/>
           </a:xfrm>
           <a:prstGeom prst="straightConnector1">
@@ -12797,7 +12797,7 @@
         </p:nvCxnSpPr>
         <p:spPr>
           <a:xfrm>
-            <a:off x="1998930" y="3327204"/>
+            <a:off x="2035313" y="4501145"/>
             <a:ext cx="700686" cy="5314"/>
           </a:xfrm>
           <a:prstGeom prst="straightConnector1">
@@ -12837,7 +12837,7 @@
         </p:nvSpPr>
         <p:spPr>
           <a:xfrm>
-            <a:off x="5579689" y="4047696"/>
+            <a:off x="5616072" y="5221637"/>
             <a:ext cx="720076" cy="360040"/>
           </a:xfrm>
           <a:prstGeom prst="rect">
@@ -12895,7 +12895,7 @@
         </p:nvCxnSpPr>
         <p:spPr>
           <a:xfrm flipV="1">
-            <a:off x="3417989" y="4227716"/>
+            <a:off x="3454372" y="5401657"/>
             <a:ext cx="732393" cy="4232"/>
           </a:xfrm>
           <a:prstGeom prst="straightConnector1">
@@ -12937,7 +12937,7 @@
         </p:nvCxnSpPr>
         <p:spPr>
           <a:xfrm>
-            <a:off x="4874234" y="4220435"/>
+            <a:off x="4910617" y="5394376"/>
             <a:ext cx="705455" cy="7281"/>
           </a:xfrm>
           <a:prstGeom prst="straightConnector1">
@@ -12976,7 +12976,7 @@
         </p:nvSpPr>
         <p:spPr>
           <a:xfrm>
-            <a:off x="1039650" y="5672374"/>
+            <a:off x="1076033" y="6846315"/>
             <a:ext cx="5541117" cy="745380"/>
           </a:xfrm>
           <a:prstGeom prst="rect">
@@ -13030,7 +13030,7 @@
         </p:nvSpPr>
         <p:spPr>
           <a:xfrm>
-            <a:off x="2693794" y="5868177"/>
+            <a:off x="2730177" y="7042118"/>
             <a:ext cx="720076" cy="360040"/>
           </a:xfrm>
           <a:prstGeom prst="rect">
@@ -13084,7 +13084,7 @@
         </p:nvSpPr>
         <p:spPr>
           <a:xfrm>
-            <a:off x="1267005" y="4785436"/>
+            <a:off x="1303388" y="5959377"/>
             <a:ext cx="727806" cy="716033"/>
           </a:xfrm>
           <a:prstGeom prst="rect">
@@ -13141,7 +13141,7 @@
         </p:nvSpPr>
         <p:spPr>
           <a:xfrm>
-            <a:off x="2695497" y="4790047"/>
+            <a:off x="2731880" y="5963988"/>
             <a:ext cx="720076" cy="717440"/>
           </a:xfrm>
           <a:prstGeom prst="rect">
@@ -13200,7 +13200,7 @@
         </p:nvSpPr>
         <p:spPr>
           <a:xfrm>
-            <a:off x="4146263" y="5863945"/>
+            <a:off x="4182646" y="7037886"/>
             <a:ext cx="720076" cy="360040"/>
           </a:xfrm>
           <a:prstGeom prst="rect">
@@ -13256,7 +13256,7 @@
         </p:nvCxnSpPr>
         <p:spPr>
           <a:xfrm>
-            <a:off x="3053832" y="5508705"/>
+            <a:off x="3090215" y="6682646"/>
             <a:ext cx="0" cy="360036"/>
           </a:xfrm>
           <a:prstGeom prst="straightConnector1">
@@ -13295,7 +13295,7 @@
         </p:nvSpPr>
         <p:spPr>
           <a:xfrm>
-            <a:off x="1277971" y="5907273"/>
+            <a:off x="1314354" y="7081214"/>
             <a:ext cx="720066" cy="276999"/>
           </a:xfrm>
           <a:prstGeom prst="rect">
@@ -13339,7 +13339,7 @@
         </p:nvCxnSpPr>
         <p:spPr>
           <a:xfrm>
-            <a:off x="1994811" y="5143453"/>
+            <a:off x="2031194" y="6317394"/>
             <a:ext cx="700686" cy="5314"/>
           </a:xfrm>
           <a:prstGeom prst="straightConnector1">
@@ -13383,7 +13383,7 @@
         </p:nvCxnSpPr>
         <p:spPr>
           <a:xfrm flipV="1">
-            <a:off x="3413870" y="6043965"/>
+            <a:off x="3450253" y="7217906"/>
             <a:ext cx="732393" cy="4232"/>
           </a:xfrm>
           <a:prstGeom prst="straightConnector1">
@@ -13425,7 +13425,7 @@
         </p:nvCxnSpPr>
         <p:spPr>
           <a:xfrm>
-            <a:off x="3057951" y="4411968"/>
+            <a:off x="3094334" y="5585909"/>
             <a:ext cx="1818" cy="373468"/>
           </a:xfrm>
           <a:prstGeom prst="straightConnector1">
@@ -13464,7 +13464,7 @@
         </p:nvSpPr>
         <p:spPr>
           <a:xfrm>
-            <a:off x="5583656" y="5863945"/>
+            <a:off x="5620039" y="7037886"/>
             <a:ext cx="720076" cy="360040"/>
           </a:xfrm>
           <a:prstGeom prst="rect">
@@ -13518,7 +13518,7 @@
         </p:nvSpPr>
         <p:spPr>
           <a:xfrm>
-            <a:off x="1039650" y="6619680"/>
+            <a:off x="1076033" y="7793621"/>
             <a:ext cx="5541117" cy="745380"/>
           </a:xfrm>
           <a:prstGeom prst="rect">
@@ -13572,7 +13572,7 @@
         </p:nvSpPr>
         <p:spPr>
           <a:xfrm>
-            <a:off x="4146263" y="6811251"/>
+            <a:off x="4182646" y="7985192"/>
             <a:ext cx="720076" cy="360040"/>
           </a:xfrm>
           <a:prstGeom prst="rect">
@@ -13626,7 +13626,7 @@
         </p:nvSpPr>
         <p:spPr>
           <a:xfrm>
-            <a:off x="1277971" y="6854579"/>
+            <a:off x="1314354" y="8028520"/>
             <a:ext cx="720066" cy="276999"/>
           </a:xfrm>
           <a:prstGeom prst="rect">
@@ -13666,7 +13666,7 @@
         </p:nvSpPr>
         <p:spPr>
           <a:xfrm>
-            <a:off x="5583656" y="6811251"/>
+            <a:off x="5620039" y="7985192"/>
             <a:ext cx="720076" cy="360040"/>
           </a:xfrm>
           <a:prstGeom prst="rect">
@@ -13724,7 +13724,7 @@
         </p:nvCxnSpPr>
         <p:spPr>
           <a:xfrm>
-            <a:off x="4506301" y="6223985"/>
+            <a:off x="4542684" y="7397926"/>
             <a:ext cx="0" cy="587266"/>
           </a:xfrm>
           <a:prstGeom prst="straightConnector1">
@@ -13767,7 +13767,7 @@
         </p:nvCxnSpPr>
         <p:spPr>
           <a:xfrm>
-            <a:off x="4866339" y="6991271"/>
+            <a:off x="4902722" y="8165212"/>
             <a:ext cx="717317" cy="0"/>
           </a:xfrm>
           <a:prstGeom prst="straightConnector1">
@@ -13792,6 +13792,316 @@
           </a:fontRef>
         </p:style>
       </p:cxnSp>
+      <p:sp>
+        <p:nvSpPr>
+          <p:cNvPr id="3" name="TextBox 2">
+            <a:extLst>
+              <a:ext uri="{FF2B5EF4-FFF2-40B4-BE49-F238E27FC236}">
+                <a16:creationId xmlns:a16="http://schemas.microsoft.com/office/drawing/2014/main" id="{D613900D-6201-B630-DDAE-2471E872A43D}"/>
+              </a:ext>
+            </a:extLst>
+          </p:cNvPr>
+          <p:cNvSpPr txBox="1"/>
+          <p:nvPr/>
+        </p:nvSpPr>
+        <p:spPr>
+          <a:xfrm>
+            <a:off x="1163650" y="179356"/>
+            <a:ext cx="1146468" cy="369332"/>
+          </a:xfrm>
+          <a:prstGeom prst="rect">
+            <a:avLst/>
+          </a:prstGeom>
+          <a:noFill/>
+        </p:spPr>
+        <p:txBody>
+          <a:bodyPr wrap="none" rtlCol="0">
+            <a:spAutoFit/>
+          </a:bodyPr>
+          <a:lstStyle/>
+          <a:p>
+            <a:r>
+              <a:rPr lang="en-US" dirty="0"/>
+              <a:t>Legend...</a:t>
+            </a:r>
+          </a:p>
+        </p:txBody>
+      </p:sp>
+      <p:sp>
+        <p:nvSpPr>
+          <p:cNvPr id="10" name="Rectangle 9">
+            <a:extLst>
+              <a:ext uri="{FF2B5EF4-FFF2-40B4-BE49-F238E27FC236}">
+                <a16:creationId xmlns:a16="http://schemas.microsoft.com/office/drawing/2014/main" id="{FFCF3759-20DB-A8F3-160A-D931DD413578}"/>
+              </a:ext>
+            </a:extLst>
+          </p:cNvPr>
+          <p:cNvSpPr/>
+          <p:nvPr/>
+        </p:nvSpPr>
+        <p:spPr>
+          <a:xfrm>
+            <a:off x="1285792" y="555160"/>
+            <a:ext cx="720076" cy="288000"/>
+          </a:xfrm>
+          <a:prstGeom prst="rect">
+            <a:avLst/>
+          </a:prstGeom>
+        </p:spPr>
+        <p:style>
+          <a:lnRef idx="2">
+            <a:schemeClr val="accent1">
+              <a:shade val="50000"/>
+            </a:schemeClr>
+          </a:lnRef>
+          <a:fillRef idx="1">
+            <a:schemeClr val="accent1"/>
+          </a:fillRef>
+          <a:effectRef idx="0">
+            <a:schemeClr val="accent1"/>
+          </a:effectRef>
+          <a:fontRef idx="minor">
+            <a:schemeClr val="lt1"/>
+          </a:fontRef>
+        </p:style>
+        <p:txBody>
+          <a:bodyPr rot="0" spcFirstLastPara="0" vertOverflow="overflow" horzOverflow="overflow" vert="horz" wrap="square" lIns="91440" tIns="45720" rIns="91440" bIns="45720" numCol="1" spcCol="0" rtlCol="0" fromWordArt="0" anchor="ctr" anchorCtr="0" forceAA="0" compatLnSpc="1">
+            <a:prstTxWarp prst="textNoShape">
+              <a:avLst/>
+            </a:prstTxWarp>
+            <a:noAutofit/>
+          </a:bodyPr>
+          <a:lstStyle/>
+          <a:p>
+            <a:pPr algn="ctr"/>
+            <a:r>
+              <a:rPr lang="en-US" dirty="0"/>
+              <a:t>1</a:t>
+            </a:r>
+          </a:p>
+        </p:txBody>
+      </p:sp>
+      <p:sp>
+        <p:nvSpPr>
+          <p:cNvPr id="11" name="Rectangle 10">
+            <a:extLst>
+              <a:ext uri="{FF2B5EF4-FFF2-40B4-BE49-F238E27FC236}">
+                <a16:creationId xmlns:a16="http://schemas.microsoft.com/office/drawing/2014/main" id="{C2523782-DF85-C5AC-FC3F-CF1E9A4E8E19}"/>
+              </a:ext>
+            </a:extLst>
+          </p:cNvPr>
+          <p:cNvSpPr/>
+          <p:nvPr/>
+        </p:nvSpPr>
+        <p:spPr>
+          <a:xfrm>
+            <a:off x="1278110" y="1262131"/>
+            <a:ext cx="720076" cy="288000"/>
+          </a:xfrm>
+          <a:prstGeom prst="rect">
+            <a:avLst/>
+          </a:prstGeom>
+          <a:solidFill>
+            <a:schemeClr val="accent2"/>
+          </a:solidFill>
+        </p:spPr>
+        <p:style>
+          <a:lnRef idx="2">
+            <a:schemeClr val="accent1">
+              <a:shade val="50000"/>
+            </a:schemeClr>
+          </a:lnRef>
+          <a:fillRef idx="1">
+            <a:schemeClr val="accent1"/>
+          </a:fillRef>
+          <a:effectRef idx="0">
+            <a:schemeClr val="accent1"/>
+          </a:effectRef>
+          <a:fontRef idx="minor">
+            <a:schemeClr val="lt1"/>
+          </a:fontRef>
+        </p:style>
+        <p:txBody>
+          <a:bodyPr rot="0" spcFirstLastPara="0" vertOverflow="overflow" horzOverflow="overflow" vert="horz" wrap="square" lIns="91440" tIns="45720" rIns="91440" bIns="45720" numCol="1" spcCol="0" rtlCol="0" fromWordArt="0" anchor="ctr" anchorCtr="0" forceAA="0" compatLnSpc="1">
+            <a:prstTxWarp prst="textNoShape">
+              <a:avLst/>
+            </a:prstTxWarp>
+            <a:noAutofit/>
+          </a:bodyPr>
+          <a:lstStyle/>
+          <a:p>
+            <a:pPr algn="ctr"/>
+            <a:r>
+              <a:rPr lang="en-US" sz="1100" dirty="0"/>
+              <a:t>Develop</a:t>
+            </a:r>
+          </a:p>
+        </p:txBody>
+      </p:sp>
+      <p:sp>
+        <p:nvSpPr>
+          <p:cNvPr id="14" name="Rectangle 13">
+            <a:extLst>
+              <a:ext uri="{FF2B5EF4-FFF2-40B4-BE49-F238E27FC236}">
+                <a16:creationId xmlns:a16="http://schemas.microsoft.com/office/drawing/2014/main" id="{60C963C6-3DC2-6D60-C9EF-2AA0D845E64A}"/>
+              </a:ext>
+            </a:extLst>
+          </p:cNvPr>
+          <p:cNvSpPr/>
+          <p:nvPr/>
+        </p:nvSpPr>
+        <p:spPr>
+          <a:xfrm>
+            <a:off x="1278110" y="907138"/>
+            <a:ext cx="720076" cy="288000"/>
+          </a:xfrm>
+          <a:prstGeom prst="rect">
+            <a:avLst/>
+          </a:prstGeom>
+          <a:pattFill prst="dkHorz">
+            <a:fgClr>
+              <a:schemeClr val="accent1"/>
+            </a:fgClr>
+            <a:bgClr>
+              <a:schemeClr val="bg1"/>
+            </a:bgClr>
+          </a:pattFill>
+        </p:spPr>
+        <p:style>
+          <a:lnRef idx="2">
+            <a:schemeClr val="accent1">
+              <a:shade val="50000"/>
+            </a:schemeClr>
+          </a:lnRef>
+          <a:fillRef idx="1">
+            <a:schemeClr val="accent1"/>
+          </a:fillRef>
+          <a:effectRef idx="0">
+            <a:schemeClr val="accent1"/>
+          </a:effectRef>
+          <a:fontRef idx="minor">
+            <a:schemeClr val="lt1"/>
+          </a:fontRef>
+        </p:style>
+        <p:txBody>
+          <a:bodyPr rot="0" spcFirstLastPara="0" vertOverflow="overflow" horzOverflow="overflow" vert="horz" wrap="square" lIns="91440" tIns="45720" rIns="91440" bIns="45720" numCol="1" spcCol="0" rtlCol="0" fromWordArt="0" anchor="ctr" anchorCtr="0" forceAA="0" compatLnSpc="1">
+            <a:prstTxWarp prst="textNoShape">
+              <a:avLst/>
+            </a:prstTxWarp>
+            <a:noAutofit/>
+          </a:bodyPr>
+          <a:lstStyle/>
+          <a:p>
+            <a:pPr algn="ctr"/>
+            <a:endParaRPr lang="en-US" dirty="0"/>
+          </a:p>
+        </p:txBody>
+      </p:sp>
+      <p:sp>
+        <p:nvSpPr>
+          <p:cNvPr id="17" name="TextBox 16">
+            <a:extLst>
+              <a:ext uri="{FF2B5EF4-FFF2-40B4-BE49-F238E27FC236}">
+                <a16:creationId xmlns:a16="http://schemas.microsoft.com/office/drawing/2014/main" id="{80047310-4BE7-8839-67DB-A9DAE28C5783}"/>
+              </a:ext>
+            </a:extLst>
+          </p:cNvPr>
+          <p:cNvSpPr txBox="1"/>
+          <p:nvPr/>
+        </p:nvSpPr>
+        <p:spPr>
+          <a:xfrm>
+            <a:off x="2056565" y="499105"/>
+            <a:ext cx="2109906" cy="400110"/>
+          </a:xfrm>
+          <a:prstGeom prst="rect">
+            <a:avLst/>
+          </a:prstGeom>
+          <a:noFill/>
+        </p:spPr>
+        <p:txBody>
+          <a:bodyPr wrap="square" rtlCol="0">
+            <a:spAutoFit/>
+          </a:bodyPr>
+          <a:lstStyle/>
+          <a:p>
+            <a:r>
+              <a:rPr lang="en-US" sz="1000" dirty="0"/>
+              <a:t>A revision of the app model on the Team Server, or local.</a:t>
+            </a:r>
+          </a:p>
+        </p:txBody>
+      </p:sp>
+      <p:sp>
+        <p:nvSpPr>
+          <p:cNvPr id="18" name="TextBox 17">
+            <a:extLst>
+              <a:ext uri="{FF2B5EF4-FFF2-40B4-BE49-F238E27FC236}">
+                <a16:creationId xmlns:a16="http://schemas.microsoft.com/office/drawing/2014/main" id="{B1A76C32-20F4-97B6-3069-E04BCCEE3A76}"/>
+              </a:ext>
+            </a:extLst>
+          </p:cNvPr>
+          <p:cNvSpPr txBox="1"/>
+          <p:nvPr/>
+        </p:nvSpPr>
+        <p:spPr>
+          <a:xfrm>
+            <a:off x="2046023" y="928028"/>
+            <a:ext cx="2109906" cy="246221"/>
+          </a:xfrm>
+          <a:prstGeom prst="rect">
+            <a:avLst/>
+          </a:prstGeom>
+          <a:noFill/>
+        </p:spPr>
+        <p:txBody>
+          <a:bodyPr wrap="square" rtlCol="0">
+            <a:spAutoFit/>
+          </a:bodyPr>
+          <a:lstStyle/>
+          <a:p>
+            <a:r>
+              <a:rPr lang="en-US" sz="1000" dirty="0"/>
+              <a:t>Models stored with Studio Pro</a:t>
+            </a:r>
+          </a:p>
+        </p:txBody>
+      </p:sp>
+      <p:sp>
+        <p:nvSpPr>
+          <p:cNvPr id="22" name="TextBox 21">
+            <a:extLst>
+              <a:ext uri="{FF2B5EF4-FFF2-40B4-BE49-F238E27FC236}">
+                <a16:creationId xmlns:a16="http://schemas.microsoft.com/office/drawing/2014/main" id="{AD92CB5E-9F3B-C90F-2B24-6EAD3966F513}"/>
+              </a:ext>
+            </a:extLst>
+          </p:cNvPr>
+          <p:cNvSpPr txBox="1"/>
+          <p:nvPr/>
+        </p:nvSpPr>
+        <p:spPr>
+          <a:xfrm>
+            <a:off x="2070946" y="1283021"/>
+            <a:ext cx="2109906" cy="246221"/>
+          </a:xfrm>
+          <a:prstGeom prst="rect">
+            <a:avLst/>
+          </a:prstGeom>
+          <a:noFill/>
+        </p:spPr>
+        <p:txBody>
+          <a:bodyPr wrap="square" rtlCol="0">
+            <a:spAutoFit/>
+          </a:bodyPr>
+          <a:lstStyle/>
+          <a:p>
+            <a:r>
+              <a:rPr lang="en-US" sz="1000" dirty="0"/>
+              <a:t>Make changes to the model.</a:t>
+            </a:r>
+          </a:p>
+        </p:txBody>
+      </p:sp>
     </p:spTree>
     <p:extLst>
       <p:ext uri="{BB962C8B-B14F-4D97-AF65-F5344CB8AC3E}">
@@ -14067,21 +14377,6 @@
 </file>
 
 <file path=customXml/item1.xml><?xml version="1.0" encoding="utf-8"?>
-<p:properties xmlns:p="http://schemas.microsoft.com/office/2006/metadata/properties" xmlns:xsi="http://www.w3.org/2001/XMLSchema-instance" xmlns:pc="http://schemas.microsoft.com/office/infopath/2007/PartnerControls">
-  <documentManagement/>
-</p:properties>
-</file>
-
-<file path=customXml/item2.xml><?xml version="1.0" encoding="utf-8"?>
-<?mso-contentType ?>
-<FormTemplates xmlns="http://schemas.microsoft.com/sharepoint/v3/contenttype/forms">
-  <Display>DocumentLibraryForm</Display>
-  <Edit>DocumentLibraryForm</Edit>
-  <New>DocumentLibraryForm</New>
-</FormTemplates>
-</file>
-
-<file path=customXml/item3.xml><?xml version="1.0" encoding="utf-8"?>
 <ct:contentTypeSchema xmlns:ct="http://schemas.microsoft.com/office/2006/metadata/contentType" xmlns:ma="http://schemas.microsoft.com/office/2006/metadata/properties/metaAttributes" ct:_="" ma:_="" ma:contentTypeName="Document" ma:contentTypeID="0x010100CB10EEC9AA2FB7408E4323A6A779B041" ma:contentTypeVersion="12" ma:contentTypeDescription="Create a new document." ma:contentTypeScope="" ma:versionID="0ccd36f27b3fab66da7d3daa9156da05">
   <xsd:schema xmlns:xsd="http://www.w3.org/2001/XMLSchema" xmlns:xs="http://www.w3.org/2001/XMLSchema" xmlns:p="http://schemas.microsoft.com/office/2006/metadata/properties" xmlns:ns3="416c5dfc-1efd-4b21-a4bc-b8850f7bb253" xmlns:ns4="3d1d779b-3ed4-468b-9ba2-fdda46887e73" targetNamespace="http://schemas.microsoft.com/office/2006/metadata/properties" ma:root="true" ma:fieldsID="c26b511b8e7b72d7d12d1f12c5f09521" ns3:_="" ns4:_="">
     <xsd:import namespace="416c5dfc-1efd-4b21-a4bc-b8850f7bb253"/>
@@ -14298,32 +14593,22 @@
 </ct:contentTypeSchema>
 </file>
 
-<file path=customXml/itemProps1.xml><?xml version="1.0" encoding="utf-8"?>
-<ds:datastoreItem xmlns:ds="http://schemas.openxmlformats.org/officeDocument/2006/customXml" ds:itemID="{03151227-4A3A-4E37-8E20-819026BD1323}">
-  <ds:schemaRefs>
-    <ds:schemaRef ds:uri="http://schemas.openxmlformats.org/package/2006/metadata/core-properties"/>
-    <ds:schemaRef ds:uri="http://purl.org/dc/terms/"/>
-    <ds:schemaRef ds:uri="http://schemas.microsoft.com/office/2006/metadata/properties"/>
-    <ds:schemaRef ds:uri="http://purl.org/dc/dcmitype/"/>
-    <ds:schemaRef ds:uri="416c5dfc-1efd-4b21-a4bc-b8850f7bb253"/>
-    <ds:schemaRef ds:uri="http://schemas.microsoft.com/office/2006/documentManagement/types"/>
-    <ds:schemaRef ds:uri="http://schemas.microsoft.com/office/infopath/2007/PartnerControls"/>
-    <ds:schemaRef ds:uri="3d1d779b-3ed4-468b-9ba2-fdda46887e73"/>
-    <ds:schemaRef ds:uri="http://www.w3.org/XML/1998/namespace"/>
-    <ds:schemaRef ds:uri="http://purl.org/dc/elements/1.1/"/>
-  </ds:schemaRefs>
-</ds:datastoreItem>
+<file path=customXml/item2.xml><?xml version="1.0" encoding="utf-8"?>
+<?mso-contentType ?>
+<FormTemplates xmlns="http://schemas.microsoft.com/sharepoint/v3/contenttype/forms">
+  <Display>DocumentLibraryForm</Display>
+  <Edit>DocumentLibraryForm</Edit>
+  <New>DocumentLibraryForm</New>
+</FormTemplates>
 </file>
 
-<file path=customXml/itemProps2.xml><?xml version="1.0" encoding="utf-8"?>
-<ds:datastoreItem xmlns:ds="http://schemas.openxmlformats.org/officeDocument/2006/customXml" ds:itemID="{4387D90F-6BE3-4885-A9F7-DA895AA34ABA}">
-  <ds:schemaRefs>
-    <ds:schemaRef ds:uri="http://schemas.microsoft.com/sharepoint/v3/contenttype/forms"/>
-  </ds:schemaRefs>
-</ds:datastoreItem>
+<file path=customXml/item3.xml><?xml version="1.0" encoding="utf-8"?>
+<p:properties xmlns:p="http://schemas.microsoft.com/office/2006/metadata/properties" xmlns:xsi="http://www.w3.org/2001/XMLSchema-instance" xmlns:pc="http://schemas.microsoft.com/office/infopath/2007/PartnerControls">
+  <documentManagement/>
+</p:properties>
 </file>
 
-<file path=customXml/itemProps3.xml><?xml version="1.0" encoding="utf-8"?>
+<file path=customXml/itemProps1.xml><?xml version="1.0" encoding="utf-8"?>
 <ds:datastoreItem xmlns:ds="http://schemas.openxmlformats.org/officeDocument/2006/customXml" ds:itemID="{EA9ADF19-CB64-4721-8E58-B7C01F3819AD}">
   <ds:schemaRefs>
     <ds:schemaRef ds:uri="http://schemas.microsoft.com/office/2006/metadata/contentType"/>
@@ -14340,4 +14625,29 @@
     <ds:schemaRef ds:uri="http://schemas.microsoft.com/internal/obd"/>
   </ds:schemaRefs>
 </ds:datastoreItem>
+</file>
+
+<file path=customXml/itemProps2.xml><?xml version="1.0" encoding="utf-8"?>
+<ds:datastoreItem xmlns:ds="http://schemas.openxmlformats.org/officeDocument/2006/customXml" ds:itemID="{4387D90F-6BE3-4885-A9F7-DA895AA34ABA}">
+  <ds:schemaRefs>
+    <ds:schemaRef ds:uri="http://schemas.microsoft.com/sharepoint/v3/contenttype/forms"/>
+  </ds:schemaRefs>
+</ds:datastoreItem>
+</file>
+
+<file path=customXml/itemProps3.xml><?xml version="1.0" encoding="utf-8"?>
+<ds:datastoreItem xmlns:ds="http://schemas.openxmlformats.org/officeDocument/2006/customXml" ds:itemID="{03151227-4A3A-4E37-8E20-819026BD1323}">
+  <ds:schemaRefs>
+    <ds:schemaRef ds:uri="http://schemas.openxmlformats.org/package/2006/metadata/core-properties"/>
+    <ds:schemaRef ds:uri="http://purl.org/dc/terms/"/>
+    <ds:schemaRef ds:uri="http://schemas.microsoft.com/office/2006/metadata/properties"/>
+    <ds:schemaRef ds:uri="http://purl.org/dc/dcmitype/"/>
+    <ds:schemaRef ds:uri="416c5dfc-1efd-4b21-a4bc-b8850f7bb253"/>
+    <ds:schemaRef ds:uri="http://schemas.microsoft.com/office/2006/documentManagement/types"/>
+    <ds:schemaRef ds:uri="http://schemas.microsoft.com/office/infopath/2007/PartnerControls"/>
+    <ds:schemaRef ds:uri="3d1d779b-3ed4-468b-9ba2-fdda46887e73"/>
+    <ds:schemaRef ds:uri="http://www.w3.org/XML/1998/namespace"/>
+    <ds:schemaRef ds:uri="http://purl.org/dc/elements/1.1/"/>
+  </ds:schemaRefs>
+</ds:datastoreItem>
 </file>
</xml_diff>